<commit_message>
Improved Motivation + Continued on MA components
</commit_message>
<xml_diff>
--- a/img/MM-M-T-A.pptx
+++ b/img/MM-M-T-A.pptx
@@ -244,7 +244,7 @@
           <a:p>
             <a:fld id="{7C30EC8E-E0C2-4688-8A21-31FBB5C9B8D6}" type="datetimeFigureOut">
               <a:rPr lang="en-GB" smtClean="0"/>
-              <a:t>18/05/2022</a:t>
+              <a:t>13/07/2022</a:t>
             </a:fld>
             <a:endParaRPr lang="en-GB"/>
           </a:p>
@@ -414,7 +414,7 @@
           <a:p>
             <a:fld id="{7C30EC8E-E0C2-4688-8A21-31FBB5C9B8D6}" type="datetimeFigureOut">
               <a:rPr lang="en-GB" smtClean="0"/>
-              <a:t>18/05/2022</a:t>
+              <a:t>13/07/2022</a:t>
             </a:fld>
             <a:endParaRPr lang="en-GB"/>
           </a:p>
@@ -594,7 +594,7 @@
           <a:p>
             <a:fld id="{7C30EC8E-E0C2-4688-8A21-31FBB5C9B8D6}" type="datetimeFigureOut">
               <a:rPr lang="en-GB" smtClean="0"/>
-              <a:t>18/05/2022</a:t>
+              <a:t>13/07/2022</a:t>
             </a:fld>
             <a:endParaRPr lang="en-GB"/>
           </a:p>
@@ -764,7 +764,7 @@
           <a:p>
             <a:fld id="{7C30EC8E-E0C2-4688-8A21-31FBB5C9B8D6}" type="datetimeFigureOut">
               <a:rPr lang="en-GB" smtClean="0"/>
-              <a:t>18/05/2022</a:t>
+              <a:t>13/07/2022</a:t>
             </a:fld>
             <a:endParaRPr lang="en-GB"/>
           </a:p>
@@ -1010,7 +1010,7 @@
           <a:p>
             <a:fld id="{7C30EC8E-E0C2-4688-8A21-31FBB5C9B8D6}" type="datetimeFigureOut">
               <a:rPr lang="en-GB" smtClean="0"/>
-              <a:t>18/05/2022</a:t>
+              <a:t>13/07/2022</a:t>
             </a:fld>
             <a:endParaRPr lang="en-GB"/>
           </a:p>
@@ -1242,7 +1242,7 @@
           <a:p>
             <a:fld id="{7C30EC8E-E0C2-4688-8A21-31FBB5C9B8D6}" type="datetimeFigureOut">
               <a:rPr lang="en-GB" smtClean="0"/>
-              <a:t>18/05/2022</a:t>
+              <a:t>13/07/2022</a:t>
             </a:fld>
             <a:endParaRPr lang="en-GB"/>
           </a:p>
@@ -1609,7 +1609,7 @@
           <a:p>
             <a:fld id="{7C30EC8E-E0C2-4688-8A21-31FBB5C9B8D6}" type="datetimeFigureOut">
               <a:rPr lang="en-GB" smtClean="0"/>
-              <a:t>18/05/2022</a:t>
+              <a:t>13/07/2022</a:t>
             </a:fld>
             <a:endParaRPr lang="en-GB"/>
           </a:p>
@@ -1727,7 +1727,7 @@
           <a:p>
             <a:fld id="{7C30EC8E-E0C2-4688-8A21-31FBB5C9B8D6}" type="datetimeFigureOut">
               <a:rPr lang="en-GB" smtClean="0"/>
-              <a:t>18/05/2022</a:t>
+              <a:t>13/07/2022</a:t>
             </a:fld>
             <a:endParaRPr lang="en-GB"/>
           </a:p>
@@ -1822,7 +1822,7 @@
           <a:p>
             <a:fld id="{7C30EC8E-E0C2-4688-8A21-31FBB5C9B8D6}" type="datetimeFigureOut">
               <a:rPr lang="en-GB" smtClean="0"/>
-              <a:t>18/05/2022</a:t>
+              <a:t>13/07/2022</a:t>
             </a:fld>
             <a:endParaRPr lang="en-GB"/>
           </a:p>
@@ -2099,7 +2099,7 @@
           <a:p>
             <a:fld id="{7C30EC8E-E0C2-4688-8A21-31FBB5C9B8D6}" type="datetimeFigureOut">
               <a:rPr lang="en-GB" smtClean="0"/>
-              <a:t>18/05/2022</a:t>
+              <a:t>13/07/2022</a:t>
             </a:fld>
             <a:endParaRPr lang="en-GB"/>
           </a:p>
@@ -2352,7 +2352,7 @@
           <a:p>
             <a:fld id="{7C30EC8E-E0C2-4688-8A21-31FBB5C9B8D6}" type="datetimeFigureOut">
               <a:rPr lang="en-GB" smtClean="0"/>
-              <a:t>18/05/2022</a:t>
+              <a:t>13/07/2022</a:t>
             </a:fld>
             <a:endParaRPr lang="en-GB"/>
           </a:p>
@@ -2565,7 +2565,7 @@
           <a:p>
             <a:fld id="{7C30EC8E-E0C2-4688-8A21-31FBB5C9B8D6}" type="datetimeFigureOut">
               <a:rPr lang="en-GB" smtClean="0"/>
-              <a:t>18/05/2022</a:t>
+              <a:t>13/07/2022</a:t>
             </a:fld>
             <a:endParaRPr lang="en-GB"/>
           </a:p>
@@ -2970,44 +2970,6 @@
           <a:chExt cx="0" cy="0"/>
         </a:xfrm>
       </p:grpSpPr>
-      <p:cxnSp>
-        <p:nvCxnSpPr>
-          <p:cNvPr id="29" name="Straight Connector 28"/>
-          <p:cNvCxnSpPr/>
-          <p:nvPr/>
-        </p:nvCxnSpPr>
-        <p:spPr>
-          <a:xfrm>
-            <a:off x="970139" y="1544591"/>
-            <a:ext cx="0" cy="432000"/>
-          </a:xfrm>
-          <a:prstGeom prst="line">
-            <a:avLst/>
-          </a:prstGeom>
-          <a:noFill/>
-          <a:ln w="12700">
-            <a:solidFill>
-              <a:schemeClr val="tx1"/>
-            </a:solidFill>
-          </a:ln>
-        </p:spPr>
-        <p:style>
-          <a:lnRef idx="2">
-            <a:schemeClr val="accent1">
-              <a:shade val="50000"/>
-            </a:schemeClr>
-          </a:lnRef>
-          <a:fillRef idx="1">
-            <a:schemeClr val="accent1"/>
-          </a:fillRef>
-          <a:effectRef idx="0">
-            <a:schemeClr val="accent1"/>
-          </a:effectRef>
-          <a:fontRef idx="minor">
-            <a:schemeClr val="lt1"/>
-          </a:fontRef>
-        </p:style>
-      </p:cxnSp>
       <p:sp>
         <p:nvSpPr>
           <p:cNvPr id="159" name="Rectangle 158"/>
@@ -3016,7 +2978,7 @@
         </p:nvSpPr>
         <p:spPr>
           <a:xfrm rot="2700000">
-            <a:off x="916139" y="1560347"/>
+            <a:off x="1173097" y="1350254"/>
             <a:ext cx="108000" cy="108000"/>
           </a:xfrm>
           <a:prstGeom prst="rect">
@@ -3108,7 +3070,7 @@
         </p:nvGrpSpPr>
         <p:grpSpPr>
           <a:xfrm>
-            <a:off x="333374" y="419100"/>
+            <a:off x="160310" y="197273"/>
             <a:ext cx="1266826" cy="559523"/>
             <a:chOff x="333374" y="419100"/>
             <a:chExt cx="1266826" cy="559523"/>
@@ -3256,7 +3218,7 @@
         </p:nvGrpSpPr>
         <p:grpSpPr>
           <a:xfrm>
-            <a:off x="1593652" y="1154200"/>
+            <a:off x="1551573" y="696999"/>
             <a:ext cx="1057277" cy="559523"/>
             <a:chOff x="1238249" y="1120272"/>
             <a:chExt cx="1057277" cy="559523"/>
@@ -3466,10 +3428,614 @@
         </p:nvSpPr>
         <p:spPr>
           <a:xfrm>
-            <a:off x="501995" y="1973702"/>
-            <a:ext cx="581026" cy="453569"/>
+            <a:off x="1302679" y="2389195"/>
+            <a:ext cx="797256" cy="630218"/>
+          </a:xfrm>
+          <a:custGeom>
+            <a:avLst/>
+            <a:gdLst>
+              <a:gd name="connsiteX0" fmla="*/ 0 w 581026"/>
+              <a:gd name="connsiteY0" fmla="*/ 0 h 453569"/>
+              <a:gd name="connsiteX1" fmla="*/ 581026 w 581026"/>
+              <a:gd name="connsiteY1" fmla="*/ 0 h 453569"/>
+              <a:gd name="connsiteX2" fmla="*/ 581026 w 581026"/>
+              <a:gd name="connsiteY2" fmla="*/ 453569 h 453569"/>
+              <a:gd name="connsiteX3" fmla="*/ 0 w 581026"/>
+              <a:gd name="connsiteY3" fmla="*/ 453569 h 453569"/>
+              <a:gd name="connsiteX4" fmla="*/ 0 w 581026"/>
+              <a:gd name="connsiteY4" fmla="*/ 0 h 453569"/>
+              <a:gd name="connsiteX0" fmla="*/ 0 w 581026"/>
+              <a:gd name="connsiteY0" fmla="*/ 0 h 453569"/>
+              <a:gd name="connsiteX1" fmla="*/ 134336 w 581026"/>
+              <a:gd name="connsiteY1" fmla="*/ 524 h 453569"/>
+              <a:gd name="connsiteX2" fmla="*/ 581026 w 581026"/>
+              <a:gd name="connsiteY2" fmla="*/ 0 h 453569"/>
+              <a:gd name="connsiteX3" fmla="*/ 581026 w 581026"/>
+              <a:gd name="connsiteY3" fmla="*/ 453569 h 453569"/>
+              <a:gd name="connsiteX4" fmla="*/ 0 w 581026"/>
+              <a:gd name="connsiteY4" fmla="*/ 453569 h 453569"/>
+              <a:gd name="connsiteX5" fmla="*/ 0 w 581026"/>
+              <a:gd name="connsiteY5" fmla="*/ 0 h 453569"/>
+              <a:gd name="connsiteX0" fmla="*/ 0 w 581026"/>
+              <a:gd name="connsiteY0" fmla="*/ 1857 h 455426"/>
+              <a:gd name="connsiteX1" fmla="*/ 134336 w 581026"/>
+              <a:gd name="connsiteY1" fmla="*/ 2381 h 455426"/>
+              <a:gd name="connsiteX2" fmla="*/ 317693 w 581026"/>
+              <a:gd name="connsiteY2" fmla="*/ 0 h 455426"/>
+              <a:gd name="connsiteX3" fmla="*/ 581026 w 581026"/>
+              <a:gd name="connsiteY3" fmla="*/ 1857 h 455426"/>
+              <a:gd name="connsiteX4" fmla="*/ 581026 w 581026"/>
+              <a:gd name="connsiteY4" fmla="*/ 455426 h 455426"/>
+              <a:gd name="connsiteX5" fmla="*/ 0 w 581026"/>
+              <a:gd name="connsiteY5" fmla="*/ 455426 h 455426"/>
+              <a:gd name="connsiteX6" fmla="*/ 0 w 581026"/>
+              <a:gd name="connsiteY6" fmla="*/ 1857 h 455426"/>
+              <a:gd name="connsiteX0" fmla="*/ 0 w 581026"/>
+              <a:gd name="connsiteY0" fmla="*/ 1857 h 455426"/>
+              <a:gd name="connsiteX1" fmla="*/ 134336 w 581026"/>
+              <a:gd name="connsiteY1" fmla="*/ 2381 h 455426"/>
+              <a:gd name="connsiteX2" fmla="*/ 317693 w 581026"/>
+              <a:gd name="connsiteY2" fmla="*/ 0 h 455426"/>
+              <a:gd name="connsiteX3" fmla="*/ 581026 w 581026"/>
+              <a:gd name="connsiteY3" fmla="*/ 1857 h 455426"/>
+              <a:gd name="connsiteX4" fmla="*/ 580347 w 581026"/>
+              <a:gd name="connsiteY4" fmla="*/ 103248 h 455426"/>
+              <a:gd name="connsiteX5" fmla="*/ 581026 w 581026"/>
+              <a:gd name="connsiteY5" fmla="*/ 455426 h 455426"/>
+              <a:gd name="connsiteX6" fmla="*/ 0 w 581026"/>
+              <a:gd name="connsiteY6" fmla="*/ 455426 h 455426"/>
+              <a:gd name="connsiteX7" fmla="*/ 0 w 581026"/>
+              <a:gd name="connsiteY7" fmla="*/ 1857 h 455426"/>
+              <a:gd name="connsiteX0" fmla="*/ 0 w 581026"/>
+              <a:gd name="connsiteY0" fmla="*/ 1857 h 455426"/>
+              <a:gd name="connsiteX1" fmla="*/ 134336 w 581026"/>
+              <a:gd name="connsiteY1" fmla="*/ 2381 h 455426"/>
+              <a:gd name="connsiteX2" fmla="*/ 317693 w 581026"/>
+              <a:gd name="connsiteY2" fmla="*/ 0 h 455426"/>
+              <a:gd name="connsiteX3" fmla="*/ 581026 w 581026"/>
+              <a:gd name="connsiteY3" fmla="*/ 1857 h 455426"/>
+              <a:gd name="connsiteX4" fmla="*/ 580347 w 581026"/>
+              <a:gd name="connsiteY4" fmla="*/ 103248 h 455426"/>
+              <a:gd name="connsiteX5" fmla="*/ 581026 w 581026"/>
+              <a:gd name="connsiteY5" fmla="*/ 455426 h 455426"/>
+              <a:gd name="connsiteX6" fmla="*/ 0 w 581026"/>
+              <a:gd name="connsiteY6" fmla="*/ 455426 h 455426"/>
+              <a:gd name="connsiteX7" fmla="*/ 0 w 581026"/>
+              <a:gd name="connsiteY7" fmla="*/ 1857 h 455426"/>
+              <a:gd name="connsiteX0" fmla="*/ 0 w 581026"/>
+              <a:gd name="connsiteY0" fmla="*/ 1857 h 456014"/>
+              <a:gd name="connsiteX1" fmla="*/ 134336 w 581026"/>
+              <a:gd name="connsiteY1" fmla="*/ 2381 h 456014"/>
+              <a:gd name="connsiteX2" fmla="*/ 317693 w 581026"/>
+              <a:gd name="connsiteY2" fmla="*/ 0 h 456014"/>
+              <a:gd name="connsiteX3" fmla="*/ 581026 w 581026"/>
+              <a:gd name="connsiteY3" fmla="*/ 1857 h 456014"/>
+              <a:gd name="connsiteX4" fmla="*/ 580347 w 581026"/>
+              <a:gd name="connsiteY4" fmla="*/ 103248 h 456014"/>
+              <a:gd name="connsiteX5" fmla="*/ 581026 w 581026"/>
+              <a:gd name="connsiteY5" fmla="*/ 455426 h 456014"/>
+              <a:gd name="connsiteX6" fmla="*/ 464074 w 581026"/>
+              <a:gd name="connsiteY6" fmla="*/ 456014 h 456014"/>
+              <a:gd name="connsiteX7" fmla="*/ 0 w 581026"/>
+              <a:gd name="connsiteY7" fmla="*/ 455426 h 456014"/>
+              <a:gd name="connsiteX8" fmla="*/ 0 w 581026"/>
+              <a:gd name="connsiteY8" fmla="*/ 1857 h 456014"/>
+              <a:gd name="connsiteX0" fmla="*/ 0 w 581026"/>
+              <a:gd name="connsiteY0" fmla="*/ 1857 h 455426"/>
+              <a:gd name="connsiteX1" fmla="*/ 134336 w 581026"/>
+              <a:gd name="connsiteY1" fmla="*/ 2381 h 455426"/>
+              <a:gd name="connsiteX2" fmla="*/ 317693 w 581026"/>
+              <a:gd name="connsiteY2" fmla="*/ 0 h 455426"/>
+              <a:gd name="connsiteX3" fmla="*/ 581026 w 581026"/>
+              <a:gd name="connsiteY3" fmla="*/ 1857 h 455426"/>
+              <a:gd name="connsiteX4" fmla="*/ 580347 w 581026"/>
+              <a:gd name="connsiteY4" fmla="*/ 103248 h 455426"/>
+              <a:gd name="connsiteX5" fmla="*/ 581026 w 581026"/>
+              <a:gd name="connsiteY5" fmla="*/ 455426 h 455426"/>
+              <a:gd name="connsiteX6" fmla="*/ 326976 w 581026"/>
+              <a:gd name="connsiteY6" fmla="*/ 454293 h 455426"/>
+              <a:gd name="connsiteX7" fmla="*/ 0 w 581026"/>
+              <a:gd name="connsiteY7" fmla="*/ 455426 h 455426"/>
+              <a:gd name="connsiteX8" fmla="*/ 0 w 581026"/>
+              <a:gd name="connsiteY8" fmla="*/ 1857 h 455426"/>
+            </a:gdLst>
+            <a:ahLst/>
+            <a:cxnLst>
+              <a:cxn ang="0">
+                <a:pos x="connsiteX0" y="connsiteY0"/>
+              </a:cxn>
+              <a:cxn ang="0">
+                <a:pos x="connsiteX1" y="connsiteY1"/>
+              </a:cxn>
+              <a:cxn ang="0">
+                <a:pos x="connsiteX2" y="connsiteY2"/>
+              </a:cxn>
+              <a:cxn ang="0">
+                <a:pos x="connsiteX3" y="connsiteY3"/>
+              </a:cxn>
+              <a:cxn ang="0">
+                <a:pos x="connsiteX4" y="connsiteY4"/>
+              </a:cxn>
+              <a:cxn ang="0">
+                <a:pos x="connsiteX5" y="connsiteY5"/>
+              </a:cxn>
+              <a:cxn ang="0">
+                <a:pos x="connsiteX6" y="connsiteY6"/>
+              </a:cxn>
+              <a:cxn ang="0">
+                <a:pos x="connsiteX7" y="connsiteY7"/>
+              </a:cxn>
+              <a:cxn ang="0">
+                <a:pos x="connsiteX8" y="connsiteY8"/>
+              </a:cxn>
+            </a:cxnLst>
+            <a:rect l="l" t="t" r="r" b="b"/>
+            <a:pathLst>
+              <a:path w="581026" h="455426">
+                <a:moveTo>
+                  <a:pt x="0" y="1857"/>
+                </a:moveTo>
+                <a:lnTo>
+                  <a:pt x="134336" y="2381"/>
+                </a:lnTo>
+                <a:lnTo>
+                  <a:pt x="317693" y="0"/>
+                </a:lnTo>
+                <a:lnTo>
+                  <a:pt x="581026" y="1857"/>
+                </a:lnTo>
+                <a:cubicBezTo>
+                  <a:pt x="580800" y="35654"/>
+                  <a:pt x="580573" y="69451"/>
+                  <a:pt x="580347" y="103248"/>
+                </a:cubicBezTo>
+                <a:cubicBezTo>
+                  <a:pt x="580573" y="220641"/>
+                  <a:pt x="580800" y="338033"/>
+                  <a:pt x="581026" y="455426"/>
+                </a:cubicBezTo>
+                <a:lnTo>
+                  <a:pt x="326976" y="454293"/>
+                </a:lnTo>
+                <a:lnTo>
+                  <a:pt x="0" y="455426"/>
+                </a:lnTo>
+                <a:lnTo>
+                  <a:pt x="0" y="1857"/>
+                </a:lnTo>
+                <a:close/>
+              </a:path>
+            </a:pathLst>
+          </a:custGeom>
+          <a:noFill/>
+          <a:ln w="25400">
+            <a:solidFill>
+              <a:schemeClr val="tx1"/>
+            </a:solidFill>
+          </a:ln>
+        </p:spPr>
+        <p:style>
+          <a:lnRef idx="2">
+            <a:schemeClr val="accent1">
+              <a:shade val="50000"/>
+            </a:schemeClr>
+          </a:lnRef>
+          <a:fillRef idx="1">
+            <a:schemeClr val="accent1"/>
+          </a:fillRef>
+          <a:effectRef idx="0">
+            <a:schemeClr val="accent1"/>
+          </a:effectRef>
+          <a:fontRef idx="minor">
+            <a:schemeClr val="lt1"/>
+          </a:fontRef>
+        </p:style>
+        <p:txBody>
+          <a:bodyPr rtlCol="0" anchor="ctr"/>
+          <a:lstStyle/>
+          <a:p>
+            <a:pPr algn="ctr"/>
+            <a:r>
+              <a:rPr lang="fr-FR" sz="1200" dirty="0" err="1" smtClean="0">
+                <a:solidFill>
+                  <a:schemeClr val="tx1"/>
+                </a:solidFill>
+                <a:latin typeface="Courier New" panose="02070309020205020404" pitchFamily="49" charset="0"/>
+                <a:cs typeface="Courier New" panose="02070309020205020404" pitchFamily="49" charset="0"/>
+              </a:rPr>
+              <a:t>Cell</a:t>
+            </a:r>
+            <a:endParaRPr lang="en-GB" sz="1200" dirty="0">
+              <a:solidFill>
+                <a:schemeClr val="tx1"/>
+              </a:solidFill>
+              <a:latin typeface="Courier New" panose="02070309020205020404" pitchFamily="49" charset="0"/>
+              <a:cs typeface="Courier New" panose="02070309020205020404" pitchFamily="49" charset="0"/>
+            </a:endParaRPr>
+          </a:p>
+        </p:txBody>
+      </p:sp>
+      <p:sp>
+        <p:nvSpPr>
+          <p:cNvPr id="16" name="TextBox 15"/>
+          <p:cNvSpPr txBox="1"/>
+          <p:nvPr/>
+        </p:nvSpPr>
+        <p:spPr>
+          <a:xfrm>
+            <a:off x="1384062" y="2983052"/>
+            <a:ext cx="465612" cy="338554"/>
           </a:xfrm>
           <a:prstGeom prst="rect">
+            <a:avLst/>
+          </a:prstGeom>
+          <a:noFill/>
+        </p:spPr>
+        <p:txBody>
+          <a:bodyPr wrap="square" rtlCol="0">
+            <a:spAutoFit/>
+          </a:bodyPr>
+          <a:lstStyle/>
+          <a:p>
+            <a:r>
+              <a:rPr lang="fr-FR" sz="800" dirty="0">
+                <a:latin typeface="Courier New" panose="02070309020205020404" pitchFamily="49" charset="0"/>
+                <a:cs typeface="Courier New" panose="02070309020205020404" pitchFamily="49" charset="0"/>
+              </a:rPr>
+              <a:t>u</a:t>
+            </a:r>
+            <a:r>
+              <a:rPr lang="fr-FR" sz="800" dirty="0" smtClean="0">
+                <a:latin typeface="Courier New" panose="02070309020205020404" pitchFamily="49" charset="0"/>
+                <a:cs typeface="Courier New" panose="02070309020205020404" pitchFamily="49" charset="0"/>
+              </a:rPr>
+              <a:t>p</a:t>
+            </a:r>
+            <a:endParaRPr lang="fr-FR" sz="800" dirty="0" smtClean="0">
+              <a:latin typeface="Courier New" panose="02070309020205020404" pitchFamily="49" charset="0"/>
+              <a:cs typeface="Courier New" panose="02070309020205020404" pitchFamily="49" charset="0"/>
+            </a:endParaRPr>
+          </a:p>
+          <a:p>
+            <a:r>
+              <a:rPr lang="fr-FR" sz="800" dirty="0">
+                <a:latin typeface="Courier New" panose="02070309020205020404" pitchFamily="49" charset="0"/>
+                <a:cs typeface="Courier New" panose="02070309020205020404" pitchFamily="49" charset="0"/>
+              </a:rPr>
+              <a:t>0..1</a:t>
+            </a:r>
+            <a:endParaRPr lang="en-GB" sz="800" dirty="0">
+              <a:latin typeface="Courier New" panose="02070309020205020404" pitchFamily="49" charset="0"/>
+              <a:cs typeface="Courier New" panose="02070309020205020404" pitchFamily="49" charset="0"/>
+            </a:endParaRPr>
+          </a:p>
+        </p:txBody>
+      </p:sp>
+      <p:sp>
+        <p:nvSpPr>
+          <p:cNvPr id="17" name="TextBox 16"/>
+          <p:cNvSpPr txBox="1"/>
+          <p:nvPr/>
+        </p:nvSpPr>
+        <p:spPr>
+          <a:xfrm>
+            <a:off x="2234815" y="2669882"/>
+            <a:ext cx="477319" cy="338554"/>
+          </a:xfrm>
+          <a:prstGeom prst="rect">
+            <a:avLst/>
+          </a:prstGeom>
+          <a:noFill/>
+        </p:spPr>
+        <p:txBody>
+          <a:bodyPr wrap="square" rtlCol="0">
+            <a:spAutoFit/>
+          </a:bodyPr>
+          <a:lstStyle/>
+          <a:p>
+            <a:r>
+              <a:rPr lang="fr-FR" sz="800" dirty="0">
+                <a:latin typeface="Courier New" panose="02070309020205020404" pitchFamily="49" charset="0"/>
+                <a:cs typeface="Courier New" panose="02070309020205020404" pitchFamily="49" charset="0"/>
+              </a:rPr>
+              <a:t>d</a:t>
+            </a:r>
+            <a:r>
+              <a:rPr lang="fr-FR" sz="800" dirty="0" smtClean="0">
+                <a:latin typeface="Courier New" panose="02070309020205020404" pitchFamily="49" charset="0"/>
+                <a:cs typeface="Courier New" panose="02070309020205020404" pitchFamily="49" charset="0"/>
+              </a:rPr>
+              <a:t>own</a:t>
+            </a:r>
+          </a:p>
+          <a:p>
+            <a:r>
+              <a:rPr lang="fr-FR" sz="800" dirty="0">
+                <a:latin typeface="Courier New" panose="02070309020205020404" pitchFamily="49" charset="0"/>
+                <a:cs typeface="Courier New" panose="02070309020205020404" pitchFamily="49" charset="0"/>
+              </a:rPr>
+              <a:t>0..1</a:t>
+            </a:r>
+            <a:endParaRPr lang="en-GB" sz="800" dirty="0">
+              <a:latin typeface="Courier New" panose="02070309020205020404" pitchFamily="49" charset="0"/>
+              <a:cs typeface="Courier New" panose="02070309020205020404" pitchFamily="49" charset="0"/>
+            </a:endParaRPr>
+          </a:p>
+        </p:txBody>
+      </p:sp>
+      <p:sp>
+        <p:nvSpPr>
+          <p:cNvPr id="18" name="TextBox 17"/>
+          <p:cNvSpPr txBox="1"/>
+          <p:nvPr/>
+        </p:nvSpPr>
+        <p:spPr>
+          <a:xfrm>
+            <a:off x="2252352" y="2335664"/>
+            <a:ext cx="490726" cy="338554"/>
+          </a:xfrm>
+          <a:prstGeom prst="rect">
+            <a:avLst/>
+          </a:prstGeom>
+          <a:noFill/>
+        </p:spPr>
+        <p:txBody>
+          <a:bodyPr wrap="square" rtlCol="0">
+            <a:spAutoFit/>
+          </a:bodyPr>
+          <a:lstStyle/>
+          <a:p>
+            <a:r>
+              <a:rPr lang="fr-FR" sz="800" dirty="0">
+                <a:latin typeface="Courier New" panose="02070309020205020404" pitchFamily="49" charset="0"/>
+                <a:cs typeface="Courier New" panose="02070309020205020404" pitchFamily="49" charset="0"/>
+              </a:rPr>
+              <a:t>0..1</a:t>
+            </a:r>
+            <a:endParaRPr lang="fr-FR" sz="800" dirty="0" smtClean="0">
+              <a:latin typeface="Courier New" panose="02070309020205020404" pitchFamily="49" charset="0"/>
+              <a:cs typeface="Courier New" panose="02070309020205020404" pitchFamily="49" charset="0"/>
+            </a:endParaRPr>
+          </a:p>
+          <a:p>
+            <a:r>
+              <a:rPr lang="fr-FR" sz="800" dirty="0" smtClean="0">
+                <a:latin typeface="Courier New" panose="02070309020205020404" pitchFamily="49" charset="0"/>
+                <a:cs typeface="Courier New" panose="02070309020205020404" pitchFamily="49" charset="0"/>
+              </a:rPr>
+              <a:t>right</a:t>
+            </a:r>
+            <a:endParaRPr lang="en-GB" sz="800" dirty="0">
+              <a:latin typeface="Courier New" panose="02070309020205020404" pitchFamily="49" charset="0"/>
+              <a:cs typeface="Courier New" panose="02070309020205020404" pitchFamily="49" charset="0"/>
+            </a:endParaRPr>
+          </a:p>
+        </p:txBody>
+      </p:sp>
+      <p:sp>
+        <p:nvSpPr>
+          <p:cNvPr id="19" name="TextBox 18"/>
+          <p:cNvSpPr txBox="1"/>
+          <p:nvPr/>
+        </p:nvSpPr>
+        <p:spPr>
+          <a:xfrm>
+            <a:off x="1846589" y="1967376"/>
+            <a:ext cx="428626" cy="338554"/>
+          </a:xfrm>
+          <a:prstGeom prst="rect">
+            <a:avLst/>
+          </a:prstGeom>
+          <a:noFill/>
+        </p:spPr>
+        <p:txBody>
+          <a:bodyPr wrap="square" rtlCol="0">
+            <a:spAutoFit/>
+          </a:bodyPr>
+          <a:lstStyle/>
+          <a:p>
+            <a:r>
+              <a:rPr lang="fr-FR" sz="800" dirty="0" smtClean="0">
+                <a:latin typeface="Courier New" panose="02070309020205020404" pitchFamily="49" charset="0"/>
+                <a:cs typeface="Courier New" panose="02070309020205020404" pitchFamily="49" charset="0"/>
+              </a:rPr>
+              <a:t>0..1</a:t>
+            </a:r>
+          </a:p>
+          <a:p>
+            <a:r>
+              <a:rPr lang="fr-FR" sz="800" dirty="0" err="1" smtClean="0">
+                <a:latin typeface="Courier New" panose="02070309020205020404" pitchFamily="49" charset="0"/>
+                <a:cs typeface="Courier New" panose="02070309020205020404" pitchFamily="49" charset="0"/>
+              </a:rPr>
+              <a:t>left</a:t>
+            </a:r>
+            <a:endParaRPr lang="en-GB" sz="800" dirty="0">
+              <a:latin typeface="Courier New" panose="02070309020205020404" pitchFamily="49" charset="0"/>
+              <a:cs typeface="Courier New" panose="02070309020205020404" pitchFamily="49" charset="0"/>
+            </a:endParaRPr>
+          </a:p>
+        </p:txBody>
+      </p:sp>
+      <p:sp>
+        <p:nvSpPr>
+          <p:cNvPr id="33" name="TextBox 32"/>
+          <p:cNvSpPr txBox="1"/>
+          <p:nvPr/>
+        </p:nvSpPr>
+        <p:spPr>
+          <a:xfrm>
+            <a:off x="1048823" y="1540919"/>
+            <a:ext cx="647354" cy="338554"/>
+          </a:xfrm>
+          <a:prstGeom prst="rect">
+            <a:avLst/>
+          </a:prstGeom>
+          <a:noFill/>
+        </p:spPr>
+        <p:txBody>
+          <a:bodyPr wrap="square" rtlCol="0">
+            <a:spAutoFit/>
+          </a:bodyPr>
+          <a:lstStyle/>
+          <a:p>
+            <a:r>
+              <a:rPr lang="fr-FR" sz="800" dirty="0" smtClean="0">
+                <a:latin typeface="Courier New" panose="02070309020205020404" pitchFamily="49" charset="0"/>
+                <a:cs typeface="Courier New" panose="02070309020205020404" pitchFamily="49" charset="0"/>
+              </a:rPr>
+              <a:t>1..* </a:t>
+            </a:r>
+            <a:r>
+              <a:rPr lang="fr-FR" sz="800" dirty="0" err="1" smtClean="0">
+                <a:latin typeface="Courier New" panose="02070309020205020404" pitchFamily="49" charset="0"/>
+                <a:cs typeface="Courier New" panose="02070309020205020404" pitchFamily="49" charset="0"/>
+              </a:rPr>
+              <a:t>cells</a:t>
+            </a:r>
+            <a:endParaRPr lang="en-GB" sz="800" dirty="0">
+              <a:latin typeface="Courier New" panose="02070309020205020404" pitchFamily="49" charset="0"/>
+              <a:cs typeface="Courier New" panose="02070309020205020404" pitchFamily="49" charset="0"/>
+            </a:endParaRPr>
+          </a:p>
+        </p:txBody>
+      </p:sp>
+      <p:sp>
+        <p:nvSpPr>
+          <p:cNvPr id="34" name="TextBox 33"/>
+          <p:cNvSpPr txBox="1"/>
+          <p:nvPr/>
+        </p:nvSpPr>
+        <p:spPr>
+          <a:xfrm>
+            <a:off x="1179942" y="1096709"/>
+            <a:ext cx="455050" cy="338554"/>
+          </a:xfrm>
+          <a:prstGeom prst="rect">
+            <a:avLst/>
+          </a:prstGeom>
+          <a:noFill/>
+        </p:spPr>
+        <p:txBody>
+          <a:bodyPr wrap="square" rtlCol="0">
+            <a:spAutoFit/>
+          </a:bodyPr>
+          <a:lstStyle/>
+          <a:p>
+            <a:r>
+              <a:rPr lang="fr-FR" sz="800" dirty="0" smtClean="0">
+                <a:latin typeface="Courier New" panose="02070309020205020404" pitchFamily="49" charset="0"/>
+                <a:cs typeface="Courier New" panose="02070309020205020404" pitchFamily="49" charset="0"/>
+              </a:rPr>
+              <a:t>1 </a:t>
+            </a:r>
+            <a:endParaRPr lang="fr-FR" sz="800" dirty="0" smtClean="0">
+              <a:latin typeface="Courier New" panose="02070309020205020404" pitchFamily="49" charset="0"/>
+              <a:cs typeface="Courier New" panose="02070309020205020404" pitchFamily="49" charset="0"/>
+            </a:endParaRPr>
+          </a:p>
+          <a:p>
+            <a:r>
+              <a:rPr lang="fr-FR" sz="800" dirty="0" smtClean="0">
+                <a:latin typeface="Courier New" panose="02070309020205020404" pitchFamily="49" charset="0"/>
+                <a:cs typeface="Courier New" panose="02070309020205020404" pitchFamily="49" charset="0"/>
+              </a:rPr>
+              <a:t>maze</a:t>
+            </a:r>
+            <a:endParaRPr lang="en-GB" sz="800" dirty="0">
+              <a:latin typeface="Courier New" panose="02070309020205020404" pitchFamily="49" charset="0"/>
+              <a:cs typeface="Courier New" panose="02070309020205020404" pitchFamily="49" charset="0"/>
+            </a:endParaRPr>
+          </a:p>
+        </p:txBody>
+      </p:sp>
+      <p:sp>
+        <p:nvSpPr>
+          <p:cNvPr id="38" name="TextBox 37"/>
+          <p:cNvSpPr txBox="1"/>
+          <p:nvPr/>
+        </p:nvSpPr>
+        <p:spPr>
+          <a:xfrm>
+            <a:off x="810146" y="1085743"/>
+            <a:ext cx="186685" cy="215444"/>
+          </a:xfrm>
+          <a:prstGeom prst="rect">
+            <a:avLst/>
+          </a:prstGeom>
+          <a:noFill/>
+        </p:spPr>
+        <p:txBody>
+          <a:bodyPr wrap="square" rtlCol="0">
+            <a:spAutoFit/>
+          </a:bodyPr>
+          <a:lstStyle/>
+          <a:p>
+            <a:r>
+              <a:rPr lang="fr-FR" sz="800" dirty="0" smtClean="0">
+                <a:latin typeface="Courier New" panose="02070309020205020404" pitchFamily="49" charset="0"/>
+                <a:cs typeface="Courier New" panose="02070309020205020404" pitchFamily="49" charset="0"/>
+              </a:rPr>
+              <a:t>1</a:t>
+            </a:r>
+            <a:endParaRPr lang="en-GB" sz="800" dirty="0">
+              <a:latin typeface="Courier New" panose="02070309020205020404" pitchFamily="49" charset="0"/>
+              <a:cs typeface="Courier New" panose="02070309020205020404" pitchFamily="49" charset="0"/>
+            </a:endParaRPr>
+          </a:p>
+        </p:txBody>
+      </p:sp>
+      <p:sp>
+        <p:nvSpPr>
+          <p:cNvPr id="39" name="TextBox 38"/>
+          <p:cNvSpPr txBox="1"/>
+          <p:nvPr/>
+        </p:nvSpPr>
+        <p:spPr>
+          <a:xfrm>
+            <a:off x="1372625" y="796013"/>
+            <a:ext cx="186685" cy="215444"/>
+          </a:xfrm>
+          <a:prstGeom prst="rect">
+            <a:avLst/>
+          </a:prstGeom>
+          <a:noFill/>
+        </p:spPr>
+        <p:txBody>
+          <a:bodyPr wrap="square" rtlCol="0">
+            <a:spAutoFit/>
+          </a:bodyPr>
+          <a:lstStyle/>
+          <a:p>
+            <a:r>
+              <a:rPr lang="fr-FR" sz="800" dirty="0" smtClean="0">
+                <a:latin typeface="Courier New" panose="02070309020205020404" pitchFamily="49" charset="0"/>
+                <a:cs typeface="Courier New" panose="02070309020205020404" pitchFamily="49" charset="0"/>
+              </a:rPr>
+              <a:t>1</a:t>
+            </a:r>
+            <a:endParaRPr lang="en-GB" sz="800" dirty="0">
+              <a:latin typeface="Courier New" panose="02070309020205020404" pitchFamily="49" charset="0"/>
+              <a:cs typeface="Courier New" panose="02070309020205020404" pitchFamily="49" charset="0"/>
+            </a:endParaRPr>
+          </a:p>
+        </p:txBody>
+      </p:sp>
+      <p:cxnSp>
+        <p:nvCxnSpPr>
+          <p:cNvPr id="41" name="Elbow Connector 40"/>
+          <p:cNvCxnSpPr>
+            <a:stCxn id="5" idx="3"/>
+            <a:endCxn id="7" idx="0"/>
+          </p:cNvCxnSpPr>
+          <p:nvPr/>
+        </p:nvCxnSpPr>
+        <p:spPr>
+          <a:xfrm>
+            <a:off x="1427135" y="335386"/>
+            <a:ext cx="653077" cy="361613"/>
+          </a:xfrm>
+          <a:prstGeom prst="bentConnector2">
             <a:avLst/>
           </a:prstGeom>
           <a:noFill/>
@@ -3495,129 +4061,17 @@
             <a:schemeClr val="lt1"/>
           </a:fontRef>
         </p:style>
-        <p:txBody>
-          <a:bodyPr rtlCol="0" anchor="ctr"/>
-          <a:lstStyle/>
-          <a:p>
-            <a:pPr algn="ctr"/>
-            <a:r>
-              <a:rPr lang="fr-FR" sz="1200" dirty="0" err="1" smtClean="0">
-                <a:solidFill>
-                  <a:schemeClr val="tx1"/>
-                </a:solidFill>
-                <a:latin typeface="Courier New" panose="02070309020205020404" pitchFamily="49" charset="0"/>
-                <a:cs typeface="Courier New" panose="02070309020205020404" pitchFamily="49" charset="0"/>
-              </a:rPr>
-              <a:t>Cell</a:t>
-            </a:r>
-            <a:endParaRPr lang="en-GB" sz="1200" dirty="0">
-              <a:solidFill>
-                <a:schemeClr val="tx1"/>
-              </a:solidFill>
-              <a:latin typeface="Courier New" panose="02070309020205020404" pitchFamily="49" charset="0"/>
-              <a:cs typeface="Courier New" panose="02070309020205020404" pitchFamily="49" charset="0"/>
-            </a:endParaRPr>
-          </a:p>
-        </p:txBody>
-      </p:sp>
-      <p:cxnSp>
-        <p:nvCxnSpPr>
-          <p:cNvPr id="13" name="Elbow Connector 12"/>
-          <p:cNvCxnSpPr>
-            <a:stCxn id="11" idx="3"/>
-            <a:endCxn id="11" idx="2"/>
-          </p:cNvCxnSpPr>
-          <p:nvPr/>
-        </p:nvCxnSpPr>
-        <p:spPr>
-          <a:xfrm flipH="1">
-            <a:off x="792508" y="2200487"/>
-            <a:ext cx="290513" cy="226784"/>
-          </a:xfrm>
-          <a:prstGeom prst="bentConnector4">
-            <a:avLst>
-              <a:gd name="adj1" fmla="val -78688"/>
-              <a:gd name="adj2" fmla="val 200801"/>
-            </a:avLst>
-          </a:prstGeom>
-          <a:noFill/>
-          <a:ln w="12700">
-            <a:solidFill>
-              <a:schemeClr val="tx1"/>
-            </a:solidFill>
-          </a:ln>
-        </p:spPr>
-        <p:style>
-          <a:lnRef idx="2">
-            <a:schemeClr val="accent1">
-              <a:shade val="50000"/>
-            </a:schemeClr>
-          </a:lnRef>
-          <a:fillRef idx="1">
-            <a:schemeClr val="accent1"/>
-          </a:fillRef>
-          <a:effectRef idx="0">
-            <a:schemeClr val="accent1"/>
-          </a:effectRef>
-          <a:fontRef idx="minor">
-            <a:schemeClr val="lt1"/>
-          </a:fontRef>
-        </p:style>
       </p:cxnSp>
-      <p:cxnSp>
-        <p:nvCxnSpPr>
-          <p:cNvPr id="15" name="Elbow Connector 14"/>
-          <p:cNvCxnSpPr>
-            <a:stCxn id="11" idx="0"/>
-            <a:endCxn id="11" idx="1"/>
-          </p:cNvCxnSpPr>
-          <p:nvPr/>
-        </p:nvCxnSpPr>
-        <p:spPr>
-          <a:xfrm rot="16200000" flipH="1" flipV="1">
-            <a:off x="533859" y="1941837"/>
-            <a:ext cx="226785" cy="290513"/>
-          </a:xfrm>
-          <a:prstGeom prst="bentConnector4">
-            <a:avLst>
-              <a:gd name="adj1" fmla="val -100800"/>
-              <a:gd name="adj2" fmla="val 178688"/>
-            </a:avLst>
-          </a:prstGeom>
-          <a:noFill/>
-          <a:ln w="12700">
-            <a:solidFill>
-              <a:schemeClr val="tx1"/>
-            </a:solidFill>
-          </a:ln>
-        </p:spPr>
-        <p:style>
-          <a:lnRef idx="2">
-            <a:schemeClr val="accent1">
-              <a:shade val="50000"/>
-            </a:schemeClr>
-          </a:lnRef>
-          <a:fillRef idx="1">
-            <a:schemeClr val="accent1"/>
-          </a:fillRef>
-          <a:effectRef idx="0">
-            <a:schemeClr val="accent1"/>
-          </a:effectRef>
-          <a:fontRef idx="minor">
-            <a:schemeClr val="lt1"/>
-          </a:fontRef>
-        </p:style>
-      </p:cxnSp>
-      <p:sp>
-        <p:nvSpPr>
-          <p:cNvPr id="16" name="TextBox 15"/>
+      <p:sp>
+        <p:nvSpPr>
+          <p:cNvPr id="42" name="TextBox 41"/>
           <p:cNvSpPr txBox="1"/>
           <p:nvPr/>
         </p:nvSpPr>
         <p:spPr>
           <a:xfrm>
-            <a:off x="528963" y="2379822"/>
-            <a:ext cx="465612" cy="338554"/>
+            <a:off x="2078104" y="519051"/>
+            <a:ext cx="704859" cy="215444"/>
           </a:xfrm>
           <a:prstGeom prst="rect">
             <a:avLst/>
@@ -3635,16 +4089,14 @@
                 <a:latin typeface="Courier New" panose="02070309020205020404" pitchFamily="49" charset="0"/>
                 <a:cs typeface="Courier New" panose="02070309020205020404" pitchFamily="49" charset="0"/>
               </a:rPr>
-              <a:t>Up</a:t>
-            </a:r>
-          </a:p>
-          <a:p>
-            <a:r>
-              <a:rPr lang="fr-FR" sz="800" dirty="0">
-                <a:latin typeface="Courier New" panose="02070309020205020404" pitchFamily="49" charset="0"/>
-                <a:cs typeface="Courier New" panose="02070309020205020404" pitchFamily="49" charset="0"/>
-              </a:rPr>
-              <a:t>0..1</a:t>
+              <a:t>* </a:t>
+            </a:r>
+            <a:r>
+              <a:rPr lang="fr-FR" sz="800" dirty="0" err="1" smtClean="0">
+                <a:latin typeface="Courier New" panose="02070309020205020404" pitchFamily="49" charset="0"/>
+                <a:cs typeface="Courier New" panose="02070309020205020404" pitchFamily="49" charset="0"/>
+              </a:rPr>
+              <a:t>levels</a:t>
             </a:r>
             <a:endParaRPr lang="en-GB" sz="800" dirty="0">
               <a:latin typeface="Courier New" panose="02070309020205020404" pitchFamily="49" charset="0"/>
@@ -3655,14 +4107,14 @@
       </p:sp>
       <p:sp>
         <p:nvSpPr>
-          <p:cNvPr id="17" name="TextBox 16"/>
+          <p:cNvPr id="43" name="TextBox 42"/>
           <p:cNvSpPr txBox="1"/>
           <p:nvPr/>
         </p:nvSpPr>
         <p:spPr>
           <a:xfrm>
-            <a:off x="1030181" y="2161057"/>
-            <a:ext cx="477319" cy="338554"/>
+            <a:off x="1465967" y="307599"/>
+            <a:ext cx="554503" cy="215444"/>
           </a:xfrm>
           <a:prstGeom prst="rect">
             <a:avLst/>
@@ -3676,27 +4128,18 @@
           <a:lstStyle/>
           <a:p>
             <a:r>
-              <a:rPr lang="fr-FR" sz="800" dirty="0">
-                <a:latin typeface="Courier New" panose="02070309020205020404" pitchFamily="49" charset="0"/>
-                <a:cs typeface="Courier New" panose="02070309020205020404" pitchFamily="49" charset="0"/>
-              </a:rPr>
-              <a:t>d</a:t>
-            </a:r>
-            <a:r>
               <a:rPr lang="fr-FR" sz="800" dirty="0" smtClean="0">
                 <a:latin typeface="Courier New" panose="02070309020205020404" pitchFamily="49" charset="0"/>
                 <a:cs typeface="Courier New" panose="02070309020205020404" pitchFamily="49" charset="0"/>
               </a:rPr>
-              <a:t>own</a:t>
-            </a:r>
-          </a:p>
-          <a:p>
-            <a:r>
-              <a:rPr lang="fr-FR" sz="800" dirty="0">
-                <a:latin typeface="Courier New" panose="02070309020205020404" pitchFamily="49" charset="0"/>
-                <a:cs typeface="Courier New" panose="02070309020205020404" pitchFamily="49" charset="0"/>
-              </a:rPr>
-              <a:t>0..1</a:t>
+              <a:t>1 </a:t>
+            </a:r>
+            <a:r>
+              <a:rPr lang="fr-FR" sz="800" dirty="0" err="1" smtClean="0">
+                <a:latin typeface="Courier New" panose="02070309020205020404" pitchFamily="49" charset="0"/>
+                <a:cs typeface="Courier New" panose="02070309020205020404" pitchFamily="49" charset="0"/>
+              </a:rPr>
+              <a:t>game</a:t>
             </a:r>
             <a:endParaRPr lang="en-GB" sz="800" dirty="0">
               <a:latin typeface="Courier New" panose="02070309020205020404" pitchFamily="49" charset="0"/>
@@ -3707,422 +4150,13 @@
       </p:sp>
       <p:sp>
         <p:nvSpPr>
-          <p:cNvPr id="18" name="TextBox 17"/>
-          <p:cNvSpPr txBox="1"/>
-          <p:nvPr/>
-        </p:nvSpPr>
-        <p:spPr>
-          <a:xfrm>
-            <a:off x="401408" y="1591314"/>
-            <a:ext cx="490726" cy="338554"/>
-          </a:xfrm>
-          <a:prstGeom prst="rect">
-            <a:avLst/>
-          </a:prstGeom>
-          <a:noFill/>
-        </p:spPr>
-        <p:txBody>
-          <a:bodyPr wrap="square" rtlCol="0">
-            <a:spAutoFit/>
-          </a:bodyPr>
-          <a:lstStyle/>
-          <a:p>
-            <a:r>
-              <a:rPr lang="fr-FR" sz="800" dirty="0">
-                <a:latin typeface="Courier New" panose="02070309020205020404" pitchFamily="49" charset="0"/>
-                <a:cs typeface="Courier New" panose="02070309020205020404" pitchFamily="49" charset="0"/>
-              </a:rPr>
-              <a:t>0..1</a:t>
-            </a:r>
-            <a:endParaRPr lang="fr-FR" sz="800" dirty="0" smtClean="0">
-              <a:latin typeface="Courier New" panose="02070309020205020404" pitchFamily="49" charset="0"/>
-              <a:cs typeface="Courier New" panose="02070309020205020404" pitchFamily="49" charset="0"/>
-            </a:endParaRPr>
-          </a:p>
-          <a:p>
-            <a:r>
-              <a:rPr lang="fr-FR" sz="800" dirty="0" smtClean="0">
-                <a:latin typeface="Courier New" panose="02070309020205020404" pitchFamily="49" charset="0"/>
-                <a:cs typeface="Courier New" panose="02070309020205020404" pitchFamily="49" charset="0"/>
-              </a:rPr>
-              <a:t>right</a:t>
-            </a:r>
-            <a:endParaRPr lang="en-GB" sz="800" dirty="0">
-              <a:latin typeface="Courier New" panose="02070309020205020404" pitchFamily="49" charset="0"/>
-              <a:cs typeface="Courier New" panose="02070309020205020404" pitchFamily="49" charset="0"/>
-            </a:endParaRPr>
-          </a:p>
-        </p:txBody>
-      </p:sp>
-      <p:sp>
-        <p:nvSpPr>
-          <p:cNvPr id="19" name="TextBox 18"/>
-          <p:cNvSpPr txBox="1"/>
-          <p:nvPr/>
-        </p:nvSpPr>
-        <p:spPr>
-          <a:xfrm>
-            <a:off x="153716" y="2153038"/>
-            <a:ext cx="428626" cy="338554"/>
-          </a:xfrm>
-          <a:prstGeom prst="rect">
-            <a:avLst/>
-          </a:prstGeom>
-          <a:noFill/>
-        </p:spPr>
-        <p:txBody>
-          <a:bodyPr wrap="square" rtlCol="0">
-            <a:spAutoFit/>
-          </a:bodyPr>
-          <a:lstStyle/>
-          <a:p>
-            <a:r>
-              <a:rPr lang="fr-FR" sz="800" dirty="0" smtClean="0">
-                <a:latin typeface="Courier New" panose="02070309020205020404" pitchFamily="49" charset="0"/>
-                <a:cs typeface="Courier New" panose="02070309020205020404" pitchFamily="49" charset="0"/>
-              </a:rPr>
-              <a:t>0..1</a:t>
-            </a:r>
-          </a:p>
-          <a:p>
-            <a:r>
-              <a:rPr lang="fr-FR" sz="800" dirty="0" err="1" smtClean="0">
-                <a:latin typeface="Courier New" panose="02070309020205020404" pitchFamily="49" charset="0"/>
-                <a:cs typeface="Courier New" panose="02070309020205020404" pitchFamily="49" charset="0"/>
-              </a:rPr>
-              <a:t>left</a:t>
-            </a:r>
-            <a:endParaRPr lang="en-GB" sz="800" dirty="0">
-              <a:latin typeface="Courier New" panose="02070309020205020404" pitchFamily="49" charset="0"/>
-              <a:cs typeface="Courier New" panose="02070309020205020404" pitchFamily="49" charset="0"/>
-            </a:endParaRPr>
-          </a:p>
-        </p:txBody>
-      </p:sp>
-      <p:sp>
-        <p:nvSpPr>
-          <p:cNvPr id="33" name="TextBox 32"/>
-          <p:cNvSpPr txBox="1"/>
-          <p:nvPr/>
-        </p:nvSpPr>
-        <p:spPr>
-          <a:xfrm>
-            <a:off x="805541" y="1792776"/>
-            <a:ext cx="647354" cy="215444"/>
-          </a:xfrm>
-          <a:prstGeom prst="rect">
-            <a:avLst/>
-          </a:prstGeom>
-          <a:noFill/>
-        </p:spPr>
-        <p:txBody>
-          <a:bodyPr wrap="square" rtlCol="0">
-            <a:spAutoFit/>
-          </a:bodyPr>
-          <a:lstStyle/>
-          <a:p>
-            <a:r>
-              <a:rPr lang="fr-FR" sz="800" dirty="0" smtClean="0">
-                <a:latin typeface="Courier New" panose="02070309020205020404" pitchFamily="49" charset="0"/>
-                <a:cs typeface="Courier New" panose="02070309020205020404" pitchFamily="49" charset="0"/>
-              </a:rPr>
-              <a:t>* </a:t>
-            </a:r>
-            <a:r>
-              <a:rPr lang="fr-FR" sz="800" dirty="0" err="1" smtClean="0">
-                <a:latin typeface="Courier New" panose="02070309020205020404" pitchFamily="49" charset="0"/>
-                <a:cs typeface="Courier New" panose="02070309020205020404" pitchFamily="49" charset="0"/>
-              </a:rPr>
-              <a:t>cells</a:t>
-            </a:r>
-            <a:endParaRPr lang="en-GB" sz="800" dirty="0">
-              <a:latin typeface="Courier New" panose="02070309020205020404" pitchFamily="49" charset="0"/>
-              <a:cs typeface="Courier New" panose="02070309020205020404" pitchFamily="49" charset="0"/>
-            </a:endParaRPr>
-          </a:p>
-        </p:txBody>
-      </p:sp>
-      <p:sp>
-        <p:nvSpPr>
-          <p:cNvPr id="34" name="TextBox 33"/>
-          <p:cNvSpPr txBox="1"/>
-          <p:nvPr/>
-        </p:nvSpPr>
-        <p:spPr>
-          <a:xfrm>
-            <a:off x="791588" y="1582824"/>
-            <a:ext cx="691246" cy="215444"/>
-          </a:xfrm>
-          <a:prstGeom prst="rect">
-            <a:avLst/>
-          </a:prstGeom>
-          <a:noFill/>
-        </p:spPr>
-        <p:txBody>
-          <a:bodyPr wrap="square" rtlCol="0">
-            <a:spAutoFit/>
-          </a:bodyPr>
-          <a:lstStyle/>
-          <a:p>
-            <a:r>
-              <a:rPr lang="fr-FR" sz="800" dirty="0" smtClean="0">
-                <a:latin typeface="Courier New" panose="02070309020205020404" pitchFamily="49" charset="0"/>
-                <a:cs typeface="Courier New" panose="02070309020205020404" pitchFamily="49" charset="0"/>
-              </a:rPr>
-              <a:t>1 maze</a:t>
-            </a:r>
-            <a:endParaRPr lang="en-GB" sz="800" dirty="0">
-              <a:latin typeface="Courier New" panose="02070309020205020404" pitchFamily="49" charset="0"/>
-              <a:cs typeface="Courier New" panose="02070309020205020404" pitchFamily="49" charset="0"/>
-            </a:endParaRPr>
-          </a:p>
-        </p:txBody>
-      </p:sp>
-      <p:cxnSp>
-        <p:nvCxnSpPr>
-          <p:cNvPr id="35" name="Straight Connector 34"/>
-          <p:cNvCxnSpPr/>
-          <p:nvPr/>
-        </p:nvCxnSpPr>
-        <p:spPr>
-          <a:xfrm flipH="1">
-            <a:off x="1154806" y="1430425"/>
-            <a:ext cx="432000" cy="0"/>
-          </a:xfrm>
-          <a:prstGeom prst="line">
-            <a:avLst/>
-          </a:prstGeom>
-          <a:noFill/>
-          <a:ln w="12700">
-            <a:solidFill>
-              <a:schemeClr val="tx1"/>
-            </a:solidFill>
-          </a:ln>
-        </p:spPr>
-        <p:style>
-          <a:lnRef idx="2">
-            <a:schemeClr val="accent1">
-              <a:shade val="50000"/>
-            </a:schemeClr>
-          </a:lnRef>
-          <a:fillRef idx="1">
-            <a:schemeClr val="accent1"/>
-          </a:fillRef>
-          <a:effectRef idx="0">
-            <a:schemeClr val="accent1"/>
-          </a:effectRef>
-          <a:fontRef idx="minor">
-            <a:schemeClr val="lt1"/>
-          </a:fontRef>
-        </p:style>
-      </p:cxnSp>
-      <p:sp>
-        <p:nvSpPr>
-          <p:cNvPr id="38" name="TextBox 37"/>
-          <p:cNvSpPr txBox="1"/>
-          <p:nvPr/>
-        </p:nvSpPr>
-        <p:spPr>
-          <a:xfrm>
-            <a:off x="1089723" y="1252456"/>
-            <a:ext cx="186685" cy="215444"/>
-          </a:xfrm>
-          <a:prstGeom prst="rect">
-            <a:avLst/>
-          </a:prstGeom>
-          <a:noFill/>
-        </p:spPr>
-        <p:txBody>
-          <a:bodyPr wrap="square" rtlCol="0">
-            <a:spAutoFit/>
-          </a:bodyPr>
-          <a:lstStyle/>
-          <a:p>
-            <a:r>
-              <a:rPr lang="fr-FR" sz="800" dirty="0" smtClean="0">
-                <a:latin typeface="Courier New" panose="02070309020205020404" pitchFamily="49" charset="0"/>
-                <a:cs typeface="Courier New" panose="02070309020205020404" pitchFamily="49" charset="0"/>
-              </a:rPr>
-              <a:t>1</a:t>
-            </a:r>
-            <a:endParaRPr lang="en-GB" sz="800" dirty="0">
-              <a:latin typeface="Courier New" panose="02070309020205020404" pitchFamily="49" charset="0"/>
-              <a:cs typeface="Courier New" panose="02070309020205020404" pitchFamily="49" charset="0"/>
-            </a:endParaRPr>
-          </a:p>
-        </p:txBody>
-      </p:sp>
-      <p:sp>
-        <p:nvSpPr>
-          <p:cNvPr id="39" name="TextBox 38"/>
-          <p:cNvSpPr txBox="1"/>
-          <p:nvPr/>
-        </p:nvSpPr>
-        <p:spPr>
-          <a:xfrm>
-            <a:off x="1419540" y="1396157"/>
-            <a:ext cx="186685" cy="215444"/>
-          </a:xfrm>
-          <a:prstGeom prst="rect">
-            <a:avLst/>
-          </a:prstGeom>
-          <a:noFill/>
-        </p:spPr>
-        <p:txBody>
-          <a:bodyPr wrap="square" rtlCol="0">
-            <a:spAutoFit/>
-          </a:bodyPr>
-          <a:lstStyle/>
-          <a:p>
-            <a:r>
-              <a:rPr lang="fr-FR" sz="800" dirty="0" smtClean="0">
-                <a:latin typeface="Courier New" panose="02070309020205020404" pitchFamily="49" charset="0"/>
-                <a:cs typeface="Courier New" panose="02070309020205020404" pitchFamily="49" charset="0"/>
-              </a:rPr>
-              <a:t>1</a:t>
-            </a:r>
-            <a:endParaRPr lang="en-GB" sz="800" dirty="0">
-              <a:latin typeface="Courier New" panose="02070309020205020404" pitchFamily="49" charset="0"/>
-              <a:cs typeface="Courier New" panose="02070309020205020404" pitchFamily="49" charset="0"/>
-            </a:endParaRPr>
-          </a:p>
-        </p:txBody>
-      </p:sp>
-      <p:cxnSp>
-        <p:nvCxnSpPr>
-          <p:cNvPr id="41" name="Elbow Connector 40"/>
-          <p:cNvCxnSpPr>
-            <a:endCxn id="7" idx="0"/>
-          </p:cNvCxnSpPr>
-          <p:nvPr/>
-        </p:nvCxnSpPr>
-        <p:spPr>
-          <a:xfrm>
-            <a:off x="1600199" y="695325"/>
-            <a:ext cx="522092" cy="458875"/>
-          </a:xfrm>
-          <a:prstGeom prst="bentConnector2">
-            <a:avLst/>
-          </a:prstGeom>
-          <a:noFill/>
-          <a:ln w="12700">
-            <a:solidFill>
-              <a:schemeClr val="tx1"/>
-            </a:solidFill>
-          </a:ln>
-        </p:spPr>
-        <p:style>
-          <a:lnRef idx="2">
-            <a:schemeClr val="accent1">
-              <a:shade val="50000"/>
-            </a:schemeClr>
-          </a:lnRef>
-          <a:fillRef idx="1">
-            <a:schemeClr val="accent1"/>
-          </a:fillRef>
-          <a:effectRef idx="0">
-            <a:schemeClr val="accent1"/>
-          </a:effectRef>
-          <a:fontRef idx="minor">
-            <a:schemeClr val="lt1"/>
-          </a:fontRef>
-        </p:style>
-      </p:cxnSp>
-      <p:sp>
-        <p:nvSpPr>
-          <p:cNvPr id="42" name="TextBox 41"/>
-          <p:cNvSpPr txBox="1"/>
-          <p:nvPr/>
-        </p:nvSpPr>
-        <p:spPr>
-          <a:xfrm>
-            <a:off x="2120183" y="976252"/>
-            <a:ext cx="704859" cy="215444"/>
-          </a:xfrm>
-          <a:prstGeom prst="rect">
-            <a:avLst/>
-          </a:prstGeom>
-          <a:noFill/>
-        </p:spPr>
-        <p:txBody>
-          <a:bodyPr wrap="square" rtlCol="0">
-            <a:spAutoFit/>
-          </a:bodyPr>
-          <a:lstStyle/>
-          <a:p>
-            <a:r>
-              <a:rPr lang="fr-FR" sz="800" dirty="0" smtClean="0">
-                <a:latin typeface="Courier New" panose="02070309020205020404" pitchFamily="49" charset="0"/>
-                <a:cs typeface="Courier New" panose="02070309020205020404" pitchFamily="49" charset="0"/>
-              </a:rPr>
-              <a:t>* </a:t>
-            </a:r>
-            <a:r>
-              <a:rPr lang="fr-FR" sz="800" dirty="0" err="1" smtClean="0">
-                <a:latin typeface="Courier New" panose="02070309020205020404" pitchFamily="49" charset="0"/>
-                <a:cs typeface="Courier New" panose="02070309020205020404" pitchFamily="49" charset="0"/>
-              </a:rPr>
-              <a:t>levels</a:t>
-            </a:r>
-            <a:endParaRPr lang="en-GB" sz="800" dirty="0">
-              <a:latin typeface="Courier New" panose="02070309020205020404" pitchFamily="49" charset="0"/>
-              <a:cs typeface="Courier New" panose="02070309020205020404" pitchFamily="49" charset="0"/>
-            </a:endParaRPr>
-          </a:p>
-        </p:txBody>
-      </p:sp>
-      <p:sp>
-        <p:nvSpPr>
-          <p:cNvPr id="43" name="TextBox 42"/>
-          <p:cNvSpPr txBox="1"/>
-          <p:nvPr/>
-        </p:nvSpPr>
-        <p:spPr>
-          <a:xfrm>
-            <a:off x="1664291" y="502549"/>
-            <a:ext cx="554503" cy="215444"/>
-          </a:xfrm>
-          <a:prstGeom prst="rect">
-            <a:avLst/>
-          </a:prstGeom>
-          <a:noFill/>
-        </p:spPr>
-        <p:txBody>
-          <a:bodyPr wrap="square" rtlCol="0">
-            <a:spAutoFit/>
-          </a:bodyPr>
-          <a:lstStyle/>
-          <a:p>
-            <a:r>
-              <a:rPr lang="fr-FR" sz="800" dirty="0" smtClean="0">
-                <a:latin typeface="Courier New" panose="02070309020205020404" pitchFamily="49" charset="0"/>
-                <a:cs typeface="Courier New" panose="02070309020205020404" pitchFamily="49" charset="0"/>
-              </a:rPr>
-              <a:t>1 </a:t>
-            </a:r>
-            <a:r>
-              <a:rPr lang="fr-FR" sz="800" dirty="0" err="1" smtClean="0">
-                <a:latin typeface="Courier New" panose="02070309020205020404" pitchFamily="49" charset="0"/>
-                <a:cs typeface="Courier New" panose="02070309020205020404" pitchFamily="49" charset="0"/>
-              </a:rPr>
-              <a:t>game</a:t>
-            </a:r>
-            <a:endParaRPr lang="en-GB" sz="800" dirty="0">
-              <a:latin typeface="Courier New" panose="02070309020205020404" pitchFamily="49" charset="0"/>
-              <a:cs typeface="Courier New" panose="02070309020205020404" pitchFamily="49" charset="0"/>
-            </a:endParaRPr>
-          </a:p>
-        </p:txBody>
-      </p:sp>
-      <p:sp>
-        <p:nvSpPr>
           <p:cNvPr id="44" name="Rectangle 43"/>
           <p:cNvSpPr/>
           <p:nvPr/>
         </p:nvSpPr>
         <p:spPr>
           <a:xfrm rot="2700000">
-            <a:off x="1622565" y="647146"/>
+            <a:off x="1439332" y="285501"/>
             <a:ext cx="108000" cy="108000"/>
           </a:xfrm>
           <a:prstGeom prst="rect">
@@ -4168,11 +4202,16 @@
         </p:nvGrpSpPr>
         <p:grpSpPr>
           <a:xfrm>
-            <a:off x="3016444" y="1154200"/>
+            <a:off x="3201611" y="1268500"/>
             <a:ext cx="1057277" cy="559523"/>
             <a:chOff x="1238249" y="1120272"/>
             <a:chExt cx="1057277" cy="559523"/>
           </a:xfrm>
+          <a:solidFill>
+            <a:schemeClr val="bg1">
+              <a:lumMod val="75000"/>
+            </a:schemeClr>
+          </a:solidFill>
         </p:grpSpPr>
         <p:sp>
           <p:nvSpPr>
@@ -4188,7 +4227,7 @@
             <a:prstGeom prst="rect">
               <a:avLst/>
             </a:prstGeom>
-            <a:noFill/>
+            <a:grpFill/>
             <a:ln w="25400">
               <a:solidFill>
                 <a:schemeClr val="tx1"/>
@@ -4217,7 +4256,7 @@
             <a:p>
               <a:pPr algn="ctr"/>
               <a:r>
-                <a:rPr lang="fr-FR" sz="1200" dirty="0" smtClean="0">
+                <a:rPr lang="fr-FR" sz="1200" b="1" i="1" dirty="0" smtClean="0">
                   <a:solidFill>
                     <a:schemeClr val="tx1"/>
                   </a:solidFill>
@@ -4226,7 +4265,7 @@
                 </a:rPr>
                 <a:t>Persona</a:t>
               </a:r>
-              <a:endParaRPr lang="en-GB" sz="1200" dirty="0">
+              <a:endParaRPr lang="en-GB" sz="1200" b="1" i="1" dirty="0">
                 <a:solidFill>
                   <a:schemeClr val="tx1"/>
                 </a:solidFill>
@@ -4250,7 +4289,7 @@
             <a:prstGeom prst="rect">
               <a:avLst/>
             </a:prstGeom>
-            <a:noFill/>
+            <a:grpFill/>
             <a:ln w="25400">
               <a:solidFill>
                 <a:schemeClr val="tx1"/>
@@ -4312,97 +4351,17 @@
         <p:nvCxnSpPr>
           <p:cNvPr id="48" name="Elbow Connector 47"/>
           <p:cNvCxnSpPr>
+            <a:stCxn id="5" idx="3"/>
             <a:endCxn id="46" idx="0"/>
           </p:cNvCxnSpPr>
           <p:nvPr/>
         </p:nvCxnSpPr>
         <p:spPr>
           <a:xfrm>
-            <a:off x="1657745" y="696383"/>
-            <a:ext cx="1887338" cy="457817"/>
+            <a:off x="1427135" y="335386"/>
+            <a:ext cx="2303115" cy="933114"/>
           </a:xfrm>
           <a:prstGeom prst="bentConnector2">
-            <a:avLst/>
-          </a:prstGeom>
-          <a:noFill/>
-          <a:ln w="12700">
-            <a:solidFill>
-              <a:schemeClr val="tx1"/>
-            </a:solidFill>
-          </a:ln>
-        </p:spPr>
-        <p:style>
-          <a:lnRef idx="2">
-            <a:schemeClr val="accent1">
-              <a:shade val="50000"/>
-            </a:schemeClr>
-          </a:lnRef>
-          <a:fillRef idx="1">
-            <a:schemeClr val="accent1"/>
-          </a:fillRef>
-          <a:effectRef idx="0">
-            <a:schemeClr val="accent1"/>
-          </a:effectRef>
-          <a:fontRef idx="minor">
-            <a:schemeClr val="lt1"/>
-          </a:fontRef>
-        </p:style>
-      </p:cxnSp>
-      <p:sp>
-        <p:nvSpPr>
-          <p:cNvPr id="51" name="TextBox 50"/>
-          <p:cNvSpPr txBox="1"/>
-          <p:nvPr/>
-        </p:nvSpPr>
-        <p:spPr>
-          <a:xfrm>
-            <a:off x="3487523" y="957504"/>
-            <a:ext cx="799146" cy="215444"/>
-          </a:xfrm>
-          <a:prstGeom prst="rect">
-            <a:avLst/>
-          </a:prstGeom>
-          <a:noFill/>
-        </p:spPr>
-        <p:txBody>
-          <a:bodyPr wrap="square" rtlCol="0">
-            <a:spAutoFit/>
-          </a:bodyPr>
-          <a:lstStyle/>
-          <a:p>
-            <a:r>
-              <a:rPr lang="fr-FR" sz="800" dirty="0" smtClean="0">
-                <a:latin typeface="Courier New" panose="02070309020205020404" pitchFamily="49" charset="0"/>
-                <a:cs typeface="Courier New" panose="02070309020205020404" pitchFamily="49" charset="0"/>
-              </a:rPr>
-              <a:t>* </a:t>
-            </a:r>
-            <a:r>
-              <a:rPr lang="fr-FR" sz="800" dirty="0" err="1" smtClean="0">
-                <a:latin typeface="Courier New" panose="02070309020205020404" pitchFamily="49" charset="0"/>
-                <a:cs typeface="Courier New" panose="02070309020205020404" pitchFamily="49" charset="0"/>
-              </a:rPr>
-              <a:t>personas</a:t>
-            </a:r>
-            <a:endParaRPr lang="en-GB" sz="800" dirty="0">
-              <a:latin typeface="Courier New" panose="02070309020205020404" pitchFamily="49" charset="0"/>
-              <a:cs typeface="Courier New" panose="02070309020205020404" pitchFamily="49" charset="0"/>
-            </a:endParaRPr>
-          </a:p>
-        </p:txBody>
-      </p:sp>
-      <p:sp>
-        <p:nvSpPr>
-          <p:cNvPr id="52" name="Rectangle 51"/>
-          <p:cNvSpPr/>
-          <p:nvPr/>
-        </p:nvSpPr>
-        <p:spPr>
-          <a:xfrm>
-            <a:off x="2713717" y="2342625"/>
-            <a:ext cx="773806" cy="276225"/>
-          </a:xfrm>
-          <a:prstGeom prst="rect">
             <a:avLst/>
           </a:prstGeom>
           <a:noFill/>
@@ -4428,6 +4387,91 @@
             <a:schemeClr val="lt1"/>
           </a:fontRef>
         </p:style>
+      </p:cxnSp>
+      <p:sp>
+        <p:nvSpPr>
+          <p:cNvPr id="51" name="TextBox 50"/>
+          <p:cNvSpPr txBox="1"/>
+          <p:nvPr/>
+        </p:nvSpPr>
+        <p:spPr>
+          <a:xfrm>
+            <a:off x="3672690" y="957504"/>
+            <a:ext cx="799146" cy="215444"/>
+          </a:xfrm>
+          <a:prstGeom prst="rect">
+            <a:avLst/>
+          </a:prstGeom>
+          <a:noFill/>
+        </p:spPr>
+        <p:txBody>
+          <a:bodyPr wrap="square" rtlCol="0">
+            <a:spAutoFit/>
+          </a:bodyPr>
+          <a:lstStyle/>
+          <a:p>
+            <a:r>
+              <a:rPr lang="fr-FR" sz="800" dirty="0" smtClean="0">
+                <a:latin typeface="Courier New" panose="02070309020205020404" pitchFamily="49" charset="0"/>
+                <a:cs typeface="Courier New" panose="02070309020205020404" pitchFamily="49" charset="0"/>
+              </a:rPr>
+              <a:t>* </a:t>
+            </a:r>
+            <a:r>
+              <a:rPr lang="fr-FR" sz="800" dirty="0" err="1" smtClean="0">
+                <a:latin typeface="Courier New" panose="02070309020205020404" pitchFamily="49" charset="0"/>
+                <a:cs typeface="Courier New" panose="02070309020205020404" pitchFamily="49" charset="0"/>
+              </a:rPr>
+              <a:t>personas</a:t>
+            </a:r>
+            <a:endParaRPr lang="en-GB" sz="800" dirty="0">
+              <a:latin typeface="Courier New" panose="02070309020205020404" pitchFamily="49" charset="0"/>
+              <a:cs typeface="Courier New" panose="02070309020205020404" pitchFamily="49" charset="0"/>
+            </a:endParaRPr>
+          </a:p>
+        </p:txBody>
+      </p:sp>
+      <p:sp>
+        <p:nvSpPr>
+          <p:cNvPr id="52" name="Rectangle 51"/>
+          <p:cNvSpPr/>
+          <p:nvPr/>
+        </p:nvSpPr>
+        <p:spPr>
+          <a:xfrm>
+            <a:off x="2898884" y="2456925"/>
+            <a:ext cx="773806" cy="276225"/>
+          </a:xfrm>
+          <a:prstGeom prst="rect">
+            <a:avLst/>
+          </a:prstGeom>
+          <a:solidFill>
+            <a:schemeClr val="bg1">
+              <a:lumMod val="75000"/>
+            </a:schemeClr>
+          </a:solidFill>
+          <a:ln w="25400">
+            <a:solidFill>
+              <a:schemeClr val="tx1"/>
+            </a:solidFill>
+          </a:ln>
+        </p:spPr>
+        <p:style>
+          <a:lnRef idx="2">
+            <a:schemeClr val="accent1">
+              <a:shade val="50000"/>
+            </a:schemeClr>
+          </a:lnRef>
+          <a:fillRef idx="1">
+            <a:schemeClr val="accent1"/>
+          </a:fillRef>
+          <a:effectRef idx="0">
+            <a:schemeClr val="accent1"/>
+          </a:effectRef>
+          <a:fontRef idx="minor">
+            <a:schemeClr val="lt1"/>
+          </a:fontRef>
+        </p:style>
         <p:txBody>
           <a:bodyPr rtlCol="0" anchor="ctr"/>
           <a:lstStyle/>
@@ -4461,13 +4505,17 @@
         </p:nvSpPr>
         <p:spPr>
           <a:xfrm>
-            <a:off x="3602642" y="2342625"/>
+            <a:off x="3787809" y="2456925"/>
             <a:ext cx="773806" cy="276225"/>
           </a:xfrm>
           <a:prstGeom prst="rect">
             <a:avLst/>
           </a:prstGeom>
-          <a:noFill/>
+          <a:solidFill>
+            <a:schemeClr val="bg1">
+              <a:lumMod val="75000"/>
+            </a:schemeClr>
+          </a:solidFill>
           <a:ln w="25400">
             <a:solidFill>
               <a:schemeClr val="tx1"/>
@@ -4526,7 +4574,7 @@
         </p:nvCxnSpPr>
         <p:spPr>
           <a:xfrm rot="16200000" flipV="1">
-            <a:off x="3452863" y="1805942"/>
+            <a:off x="3638030" y="1920242"/>
             <a:ext cx="628902" cy="444463"/>
           </a:xfrm>
           <a:prstGeom prst="bentConnector3">
@@ -4567,7 +4615,7 @@
         </p:nvCxnSpPr>
         <p:spPr>
           <a:xfrm rot="5400000" flipH="1" flipV="1">
-            <a:off x="3008400" y="1805943"/>
+            <a:off x="3193567" y="1920243"/>
             <a:ext cx="628902" cy="444462"/>
           </a:xfrm>
           <a:prstGeom prst="bentConnector3">
@@ -4605,7 +4653,7 @@
         </p:nvSpPr>
         <p:spPr>
           <a:xfrm>
-            <a:off x="3482483" y="1718971"/>
+            <a:off x="3667650" y="1833271"/>
             <a:ext cx="125198" cy="137746"/>
           </a:xfrm>
           <a:prstGeom prst="triangle">
@@ -4645,48 +4693,6 @@
           </a:p>
         </p:txBody>
       </p:sp>
-      <p:cxnSp>
-        <p:nvCxnSpPr>
-          <p:cNvPr id="60" name="Elbow Connector 59"/>
-          <p:cNvCxnSpPr>
-            <a:stCxn id="47" idx="1"/>
-          </p:cNvCxnSpPr>
-          <p:nvPr/>
-        </p:nvCxnSpPr>
-        <p:spPr>
-          <a:xfrm rot="10800000" flipV="1">
-            <a:off x="1097342" y="1572073"/>
-            <a:ext cx="1919102" cy="527597"/>
-          </a:xfrm>
-          <a:prstGeom prst="bentConnector3">
-            <a:avLst>
-              <a:gd name="adj1" fmla="val 10046"/>
-            </a:avLst>
-          </a:prstGeom>
-          <a:noFill/>
-          <a:ln w="12700">
-            <a:solidFill>
-              <a:schemeClr val="tx1"/>
-            </a:solidFill>
-          </a:ln>
-        </p:spPr>
-        <p:style>
-          <a:lnRef idx="2">
-            <a:schemeClr val="accent1">
-              <a:shade val="50000"/>
-            </a:schemeClr>
-          </a:lnRef>
-          <a:fillRef idx="1">
-            <a:schemeClr val="accent1"/>
-          </a:fillRef>
-          <a:effectRef idx="0">
-            <a:schemeClr val="accent1"/>
-          </a:effectRef>
-          <a:fontRef idx="minor">
-            <a:schemeClr val="lt1"/>
-          </a:fontRef>
-        </p:style>
-      </p:cxnSp>
       <p:sp>
         <p:nvSpPr>
           <p:cNvPr id="66" name="TextBox 65"/>
@@ -4695,8 +4701,8 @@
         </p:nvSpPr>
         <p:spPr>
           <a:xfrm>
-            <a:off x="1616452" y="1934808"/>
-            <a:ext cx="753571" cy="215444"/>
+            <a:off x="1709990" y="1402741"/>
+            <a:ext cx="437338" cy="338554"/>
           </a:xfrm>
           <a:prstGeom prst="rect">
             <a:avLst/>
@@ -4710,13 +4716,38 @@
           <a:lstStyle/>
           <a:p>
             <a:r>
-              <a:rPr lang="fr-FR" sz="800" dirty="0" smtClean="0">
-                <a:latin typeface="Courier New" panose="02070309020205020404" pitchFamily="49" charset="0"/>
-                <a:cs typeface="Courier New" panose="02070309020205020404" pitchFamily="49" charset="0"/>
-              </a:rPr>
-              <a:t>0..1  in</a:t>
-            </a:r>
-            <a:endParaRPr lang="en-GB" sz="800" dirty="0">
+              <a:rPr lang="fr-FR" sz="800" b="1" dirty="0" smtClean="0">
+                <a:solidFill>
+                  <a:srgbClr val="FF0000"/>
+                </a:solidFill>
+                <a:latin typeface="Courier New" panose="02070309020205020404" pitchFamily="49" charset="0"/>
+                <a:cs typeface="Courier New" panose="02070309020205020404" pitchFamily="49" charset="0"/>
+              </a:rPr>
+              <a:t>0..1  </a:t>
+            </a:r>
+            <a:endParaRPr lang="fr-FR" sz="800" b="1" dirty="0" smtClean="0">
+              <a:solidFill>
+                <a:srgbClr val="FF0000"/>
+              </a:solidFill>
+              <a:latin typeface="Courier New" panose="02070309020205020404" pitchFamily="49" charset="0"/>
+              <a:cs typeface="Courier New" panose="02070309020205020404" pitchFamily="49" charset="0"/>
+            </a:endParaRPr>
+          </a:p>
+          <a:p>
+            <a:r>
+              <a:rPr lang="fr-FR" sz="800" b="1" dirty="0" smtClean="0">
+                <a:solidFill>
+                  <a:srgbClr val="FF0000"/>
+                </a:solidFill>
+                <a:latin typeface="Courier New" panose="02070309020205020404" pitchFamily="49" charset="0"/>
+                <a:cs typeface="Courier New" panose="02070309020205020404" pitchFamily="49" charset="0"/>
+              </a:rPr>
+              <a:t>in</a:t>
+            </a:r>
+            <a:endParaRPr lang="en-GB" sz="800" b="1" dirty="0">
+              <a:solidFill>
+                <a:srgbClr val="FF0000"/>
+              </a:solidFill>
               <a:latin typeface="Courier New" panose="02070309020205020404" pitchFamily="49" charset="0"/>
               <a:cs typeface="Courier New" panose="02070309020205020404" pitchFamily="49" charset="0"/>
             </a:endParaRPr>
@@ -7711,8 +7742,8 @@
         </p:nvSpPr>
         <p:spPr>
           <a:xfrm>
-            <a:off x="957941" y="1945176"/>
-            <a:ext cx="647354" cy="215444"/>
+            <a:off x="132128" y="1619143"/>
+            <a:ext cx="647354" cy="338554"/>
           </a:xfrm>
           <a:prstGeom prst="rect">
             <a:avLst/>
@@ -7733,11 +7764,11 @@
               <a:t>* </a:t>
             </a:r>
             <a:r>
-              <a:rPr lang="fr-FR" sz="800" dirty="0" err="1" smtClean="0">
-                <a:latin typeface="Courier New" panose="02070309020205020404" pitchFamily="49" charset="0"/>
-                <a:cs typeface="Courier New" panose="02070309020205020404" pitchFamily="49" charset="0"/>
-              </a:rPr>
-              <a:t>cells</a:t>
+              <a:rPr lang="fr-FR" sz="800" dirty="0" smtClean="0">
+                <a:latin typeface="Courier New" panose="02070309020205020404" pitchFamily="49" charset="0"/>
+                <a:cs typeface="Courier New" panose="02070309020205020404" pitchFamily="49" charset="0"/>
+              </a:rPr>
+              <a:t>cookies</a:t>
             </a:r>
             <a:endParaRPr lang="en-GB" sz="800" dirty="0">
               <a:latin typeface="Courier New" panose="02070309020205020404" pitchFamily="49" charset="0"/>
@@ -10827,7 +10858,7 @@
         </p:nvSpPr>
         <p:spPr>
           <a:xfrm>
-            <a:off x="472684" y="2959697"/>
+            <a:off x="275046" y="1946439"/>
             <a:ext cx="783217" cy="276225"/>
           </a:xfrm>
           <a:prstGeom prst="rect">
@@ -10892,16 +10923,16 @@
         </p:nvCxnSpPr>
         <p:spPr>
           <a:xfrm rot="10800000" flipV="1">
-            <a:off x="472684" y="1400034"/>
-            <a:ext cx="101096" cy="1697776"/>
+            <a:off x="275046" y="1400034"/>
+            <a:ext cx="298734" cy="684518"/>
           </a:xfrm>
           <a:prstGeom prst="bentConnector3">
             <a:avLst>
-              <a:gd name="adj1" fmla="val 377942"/>
+              <a:gd name="adj1" fmla="val 125508"/>
             </a:avLst>
           </a:prstGeom>
           <a:noFill/>
-          <a:ln w="12700">
+          <a:ln w="25400">
             <a:solidFill>
               <a:schemeClr val="tx1"/>
             </a:solidFill>
@@ -10974,23 +11005,20 @@
         <p:nvCxnSpPr>
           <p:cNvPr id="256" name="Elbow Connector 255"/>
           <p:cNvCxnSpPr>
-            <a:stCxn id="248" idx="3"/>
+            <a:endCxn id="248" idx="2"/>
           </p:cNvCxnSpPr>
           <p:nvPr/>
         </p:nvCxnSpPr>
         <p:spPr>
-          <a:xfrm flipH="1" flipV="1">
-            <a:off x="1083021" y="2122792"/>
-            <a:ext cx="172880" cy="975018"/>
-          </a:xfrm>
-          <a:prstGeom prst="bentConnector4">
-            <a:avLst>
-              <a:gd name="adj1" fmla="val -303028"/>
-              <a:gd name="adj2" fmla="val 102509"/>
-            </a:avLst>
+          <a:xfrm rot="10800000">
+            <a:off x="666655" y="2222665"/>
+            <a:ext cx="657410" cy="652551"/>
+          </a:xfrm>
+          <a:prstGeom prst="bentConnector2">
+            <a:avLst/>
           </a:prstGeom>
           <a:noFill/>
-          <a:ln w="12700">
+          <a:ln w="25400">
             <a:solidFill>
               <a:schemeClr val="tx1"/>
             </a:solidFill>
@@ -11021,7 +11049,7 @@
         </p:nvSpPr>
         <p:spPr>
           <a:xfrm>
-            <a:off x="1537093" y="2739831"/>
+            <a:off x="1057788" y="2708699"/>
             <a:ext cx="318789" cy="338554"/>
           </a:xfrm>
           <a:prstGeom prst="rect">
@@ -11594,6 +11622,271 @@
           </a:p>
         </p:txBody>
       </p:sp>
+      <p:cxnSp>
+        <p:nvCxnSpPr>
+          <p:cNvPr id="28" name="Elbow Connector 27"/>
+          <p:cNvCxnSpPr>
+            <a:stCxn id="7" idx="1"/>
+            <a:endCxn id="9" idx="0"/>
+          </p:cNvCxnSpPr>
+          <p:nvPr/>
+        </p:nvCxnSpPr>
+        <p:spPr>
+          <a:xfrm rot="10800000" flipV="1">
+            <a:off x="864294" y="835111"/>
+            <a:ext cx="687281" cy="426809"/>
+          </a:xfrm>
+          <a:prstGeom prst="bentConnector2">
+            <a:avLst/>
+          </a:prstGeom>
+          <a:noFill/>
+          <a:ln w="25400">
+            <a:solidFill>
+              <a:schemeClr val="tx1"/>
+            </a:solidFill>
+          </a:ln>
+        </p:spPr>
+        <p:style>
+          <a:lnRef idx="2">
+            <a:schemeClr val="accent1">
+              <a:shade val="50000"/>
+            </a:schemeClr>
+          </a:lnRef>
+          <a:fillRef idx="1">
+            <a:schemeClr val="accent1"/>
+          </a:fillRef>
+          <a:effectRef idx="0">
+            <a:schemeClr val="accent1"/>
+          </a:effectRef>
+          <a:fontRef idx="minor">
+            <a:schemeClr val="lt1"/>
+          </a:fontRef>
+        </p:style>
+      </p:cxnSp>
+      <p:cxnSp>
+        <p:nvCxnSpPr>
+          <p:cNvPr id="183" name="Elbow Connector 182"/>
+          <p:cNvCxnSpPr>
+            <a:stCxn id="9" idx="3"/>
+            <a:endCxn id="11" idx="1"/>
+          </p:cNvCxnSpPr>
+          <p:nvPr/>
+        </p:nvCxnSpPr>
+        <p:spPr>
+          <a:xfrm>
+            <a:off x="1154806" y="1400034"/>
+            <a:ext cx="332202" cy="992456"/>
+          </a:xfrm>
+          <a:prstGeom prst="bentConnector3">
+            <a:avLst>
+              <a:gd name="adj1" fmla="val 98708"/>
+            </a:avLst>
+          </a:prstGeom>
+          <a:noFill/>
+          <a:ln w="25400">
+            <a:solidFill>
+              <a:schemeClr val="tx1"/>
+            </a:solidFill>
+          </a:ln>
+        </p:spPr>
+        <p:style>
+          <a:lnRef idx="2">
+            <a:schemeClr val="accent1">
+              <a:shade val="50000"/>
+            </a:schemeClr>
+          </a:lnRef>
+          <a:fillRef idx="1">
+            <a:schemeClr val="accent1"/>
+          </a:fillRef>
+          <a:effectRef idx="0">
+            <a:schemeClr val="accent1"/>
+          </a:effectRef>
+          <a:fontRef idx="minor">
+            <a:schemeClr val="lt1"/>
+          </a:fontRef>
+        </p:style>
+      </p:cxnSp>
+      <p:cxnSp>
+        <p:nvCxnSpPr>
+          <p:cNvPr id="239" name="Elbow Connector 238"/>
+          <p:cNvCxnSpPr>
+            <a:stCxn id="11" idx="6"/>
+          </p:cNvCxnSpPr>
+          <p:nvPr/>
+        </p:nvCxnSpPr>
+        <p:spPr>
+          <a:xfrm flipV="1">
+            <a:off x="1751340" y="2704304"/>
+            <a:ext cx="348595" cy="313541"/>
+          </a:xfrm>
+          <a:prstGeom prst="bentConnector5">
+            <a:avLst>
+              <a:gd name="adj1" fmla="val 1"/>
+              <a:gd name="adj2" fmla="val -44961"/>
+              <a:gd name="adj3" fmla="val 152461"/>
+            </a:avLst>
+          </a:prstGeom>
+          <a:noFill/>
+          <a:ln w="25400">
+            <a:solidFill>
+              <a:schemeClr val="tx1"/>
+            </a:solidFill>
+          </a:ln>
+        </p:spPr>
+        <p:style>
+          <a:lnRef idx="2">
+            <a:schemeClr val="accent1">
+              <a:shade val="50000"/>
+            </a:schemeClr>
+          </a:lnRef>
+          <a:fillRef idx="1">
+            <a:schemeClr val="accent1"/>
+          </a:fillRef>
+          <a:effectRef idx="0">
+            <a:schemeClr val="accent1"/>
+          </a:effectRef>
+          <a:fontRef idx="minor">
+            <a:schemeClr val="lt1"/>
+          </a:fontRef>
+        </p:style>
+      </p:cxnSp>
+      <p:cxnSp>
+        <p:nvCxnSpPr>
+          <p:cNvPr id="252" name="Elbow Connector 251"/>
+          <p:cNvCxnSpPr>
+            <a:endCxn id="11" idx="2"/>
+          </p:cNvCxnSpPr>
+          <p:nvPr/>
+        </p:nvCxnSpPr>
+        <p:spPr>
+          <a:xfrm rot="10800000">
+            <a:off x="1738603" y="2389195"/>
+            <a:ext cx="357553" cy="229656"/>
+          </a:xfrm>
+          <a:prstGeom prst="bentConnector5">
+            <a:avLst>
+              <a:gd name="adj1" fmla="val -53278"/>
+              <a:gd name="adj2" fmla="val 159724"/>
+              <a:gd name="adj3" fmla="val 57376"/>
+            </a:avLst>
+          </a:prstGeom>
+          <a:noFill/>
+          <a:ln w="25400">
+            <a:solidFill>
+              <a:schemeClr val="tx1"/>
+            </a:solidFill>
+          </a:ln>
+        </p:spPr>
+        <p:style>
+          <a:lnRef idx="2">
+            <a:schemeClr val="accent1">
+              <a:shade val="50000"/>
+            </a:schemeClr>
+          </a:lnRef>
+          <a:fillRef idx="1">
+            <a:schemeClr val="accent1"/>
+          </a:fillRef>
+          <a:effectRef idx="0">
+            <a:schemeClr val="accent1"/>
+          </a:effectRef>
+          <a:fontRef idx="minor">
+            <a:schemeClr val="lt1"/>
+          </a:fontRef>
+        </p:style>
+      </p:cxnSp>
+      <p:sp>
+        <p:nvSpPr>
+          <p:cNvPr id="264" name="TextBox 263"/>
+          <p:cNvSpPr txBox="1"/>
+          <p:nvPr/>
+        </p:nvSpPr>
+        <p:spPr>
+          <a:xfrm>
+            <a:off x="127719" y="1104471"/>
+            <a:ext cx="447579" cy="338554"/>
+          </a:xfrm>
+          <a:prstGeom prst="rect">
+            <a:avLst/>
+          </a:prstGeom>
+          <a:noFill/>
+        </p:spPr>
+        <p:txBody>
+          <a:bodyPr wrap="square" rtlCol="0">
+            <a:spAutoFit/>
+          </a:bodyPr>
+          <a:lstStyle/>
+          <a:p>
+            <a:r>
+              <a:rPr lang="fr-FR" sz="800" dirty="0" smtClean="0">
+                <a:latin typeface="Courier New" panose="02070309020205020404" pitchFamily="49" charset="0"/>
+                <a:cs typeface="Courier New" panose="02070309020205020404" pitchFamily="49" charset="0"/>
+              </a:rPr>
+              <a:t>1 </a:t>
+            </a:r>
+            <a:endParaRPr lang="fr-FR" sz="800" dirty="0" smtClean="0">
+              <a:latin typeface="Courier New" panose="02070309020205020404" pitchFamily="49" charset="0"/>
+              <a:cs typeface="Courier New" panose="02070309020205020404" pitchFamily="49" charset="0"/>
+            </a:endParaRPr>
+          </a:p>
+          <a:p>
+            <a:r>
+              <a:rPr lang="fr-FR" sz="800" dirty="0" smtClean="0">
+                <a:latin typeface="Courier New" panose="02070309020205020404" pitchFamily="49" charset="0"/>
+                <a:cs typeface="Courier New" panose="02070309020205020404" pitchFamily="49" charset="0"/>
+              </a:rPr>
+              <a:t>maze</a:t>
+            </a:r>
+            <a:endParaRPr lang="en-GB" sz="800" dirty="0">
+              <a:latin typeface="Courier New" panose="02070309020205020404" pitchFamily="49" charset="0"/>
+              <a:cs typeface="Courier New" panose="02070309020205020404" pitchFamily="49" charset="0"/>
+            </a:endParaRPr>
+          </a:p>
+        </p:txBody>
+      </p:sp>
+      <p:cxnSp>
+        <p:nvCxnSpPr>
+          <p:cNvPr id="266" name="Elbow Connector 265"/>
+          <p:cNvCxnSpPr>
+            <a:stCxn id="46" idx="1"/>
+            <a:endCxn id="11" idx="2"/>
+          </p:cNvCxnSpPr>
+          <p:nvPr/>
+        </p:nvCxnSpPr>
+        <p:spPr>
+          <a:xfrm rot="10800000" flipV="1">
+            <a:off x="1738602" y="1406613"/>
+            <a:ext cx="1463010" cy="982582"/>
+          </a:xfrm>
+          <a:prstGeom prst="bentConnector3">
+            <a:avLst>
+              <a:gd name="adj1" fmla="val 101042"/>
+            </a:avLst>
+          </a:prstGeom>
+          <a:noFill/>
+          <a:ln w="25400">
+            <a:solidFill>
+              <a:schemeClr val="tx1"/>
+            </a:solidFill>
+            <a:prstDash val="dash"/>
+          </a:ln>
+        </p:spPr>
+        <p:style>
+          <a:lnRef idx="2">
+            <a:schemeClr val="accent1">
+              <a:shade val="50000"/>
+            </a:schemeClr>
+          </a:lnRef>
+          <a:fillRef idx="1">
+            <a:schemeClr val="accent1"/>
+          </a:fillRef>
+          <a:effectRef idx="0">
+            <a:schemeClr val="accent1"/>
+          </a:effectRef>
+          <a:fontRef idx="minor">
+            <a:schemeClr val="lt1"/>
+          </a:fontRef>
+        </p:style>
+      </p:cxnSp>
     </p:spTree>
     <p:extLst>
       <p:ext uri="{BB962C8B-B14F-4D97-AF65-F5344CB8AC3E}">

</xml_diff>